<commit_message>
1st draft of script
</commit_message>
<xml_diff>
--- a/Documentação/Apresentação.pptx
+++ b/Documentação/Apresentação.pptx
@@ -10,6 +10,12 @@
     <p:sldId id="258" r:id="rId4"/>
     <p:sldId id="260" r:id="rId5"/>
     <p:sldId id="259" r:id="rId6"/>
+    <p:sldId id="261" r:id="rId7"/>
+    <p:sldId id="263" r:id="rId8"/>
+    <p:sldId id="262" r:id="rId9"/>
+    <p:sldId id="264" r:id="rId10"/>
+    <p:sldId id="265" r:id="rId11"/>
+    <p:sldId id="266" r:id="rId12"/>
   </p:sldIdLst>
   <p:sldSz cx="12192000" cy="6858000"/>
   <p:notesSz cx="6858000" cy="9144000"/>
@@ -108,6 +114,11 @@
       </a:defRPr>
     </a:lvl9pPr>
   </p:defaultTextStyle>
+  <p:extLst>
+    <p:ext uri="{EFAFB233-063F-42B5-8137-9DF3F51BA10A}">
+      <p15:sldGuideLst xmlns:p15="http://schemas.microsoft.com/office/powerpoint/2012/main"/>
+    </p:ext>
+  </p:extLst>
 </p:presentation>
 </file>
 
@@ -3011,6 +3022,173 @@
   <p:clrMapOvr>
     <a:masterClrMapping/>
   </p:clrMapOvr>
+  <p:timing>
+    <p:tnLst>
+      <p:par>
+        <p:cTn id="1" dur="indefinite" restart="never" nodeType="tmRoot"/>
+      </p:par>
+    </p:tnLst>
+  </p:timing>
+</p:sld>
+</file>
+
+<file path=ppt/slides/slide10.xml><?xml version="1.0" encoding="utf-8"?>
+<p:sld xmlns:a="http://schemas.openxmlformats.org/drawingml/2006/main" xmlns:r="http://schemas.openxmlformats.org/officeDocument/2006/relationships" xmlns:p="http://schemas.openxmlformats.org/presentationml/2006/main">
+  <p:cSld>
+    <p:spTree>
+      <p:nvGrpSpPr>
+        <p:cNvPr id="1" name=""/>
+        <p:cNvGrpSpPr/>
+        <p:nvPr/>
+      </p:nvGrpSpPr>
+      <p:grpSpPr>
+        <a:xfrm>
+          <a:off x="0" y="0"/>
+          <a:ext cx="0" cy="0"/>
+          <a:chOff x="0" y="0"/>
+          <a:chExt cx="0" cy="0"/>
+        </a:xfrm>
+      </p:grpSpPr>
+      <p:sp>
+        <p:nvSpPr>
+          <p:cNvPr id="3" name="TextBox 2"/>
+          <p:cNvSpPr txBox="1"/>
+          <p:nvPr/>
+        </p:nvSpPr>
+        <p:spPr>
+          <a:xfrm>
+            <a:off x="2852738" y="3244334"/>
+            <a:ext cx="6486525" cy="369332"/>
+          </a:xfrm>
+          <a:prstGeom prst="rect">
+            <a:avLst/>
+          </a:prstGeom>
+          <a:noFill/>
+        </p:spPr>
+        <p:txBody>
+          <a:bodyPr wrap="square" rtlCol="0">
+            <a:spAutoFit/>
+          </a:bodyPr>
+          <a:lstStyle/>
+          <a:p>
+            <a:pPr algn="ctr"/>
+            <a:r>
+              <a:rPr lang="pt-PT" dirty="0" smtClean="0">
+                <a:solidFill>
+                  <a:srgbClr val="FF0000"/>
+                </a:solidFill>
+              </a:rPr>
+              <a:t>[Pôr </a:t>
+            </a:r>
+            <a:r>
+              <a:rPr lang="pt-PT" dirty="0" smtClean="0">
+                <a:solidFill>
+                  <a:srgbClr val="FF0000"/>
+                </a:solidFill>
+              </a:rPr>
+              <a:t>link]</a:t>
+            </a:r>
+            <a:endParaRPr lang="en-GB" dirty="0">
+              <a:solidFill>
+                <a:srgbClr val="FF0000"/>
+              </a:solidFill>
+            </a:endParaRPr>
+          </a:p>
+        </p:txBody>
+      </p:sp>
+    </p:spTree>
+    <p:extLst>
+      <p:ext uri="{BB962C8B-B14F-4D97-AF65-F5344CB8AC3E}">
+        <p14:creationId xmlns:p14="http://schemas.microsoft.com/office/powerpoint/2010/main" val="4159450050"/>
+      </p:ext>
+    </p:extLst>
+  </p:cSld>
+  <p:clrMapOvr>
+    <a:masterClrMapping/>
+  </p:clrMapOvr>
+  <p:timing>
+    <p:tnLst>
+      <p:par>
+        <p:cTn id="1" dur="indefinite" restart="never" nodeType="tmRoot"/>
+      </p:par>
+    </p:tnLst>
+  </p:timing>
+</p:sld>
+</file>
+
+<file path=ppt/slides/slide11.xml><?xml version="1.0" encoding="utf-8"?>
+<p:sld xmlns:a="http://schemas.openxmlformats.org/drawingml/2006/main" xmlns:r="http://schemas.openxmlformats.org/officeDocument/2006/relationships" xmlns:p="http://schemas.openxmlformats.org/presentationml/2006/main">
+  <p:cSld>
+    <p:spTree>
+      <p:nvGrpSpPr>
+        <p:cNvPr id="1" name=""/>
+        <p:cNvGrpSpPr/>
+        <p:nvPr/>
+      </p:nvGrpSpPr>
+      <p:grpSpPr>
+        <a:xfrm>
+          <a:off x="0" y="0"/>
+          <a:ext cx="0" cy="0"/>
+          <a:chOff x="0" y="0"/>
+          <a:chExt cx="0" cy="0"/>
+        </a:xfrm>
+      </p:grpSpPr>
+      <p:sp>
+        <p:nvSpPr>
+          <p:cNvPr id="2" name="TextBox 1"/>
+          <p:cNvSpPr txBox="1"/>
+          <p:nvPr/>
+        </p:nvSpPr>
+        <p:spPr>
+          <a:xfrm>
+            <a:off x="2852738" y="3244334"/>
+            <a:ext cx="6486525" cy="369332"/>
+          </a:xfrm>
+          <a:prstGeom prst="rect">
+            <a:avLst/>
+          </a:prstGeom>
+          <a:noFill/>
+        </p:spPr>
+        <p:txBody>
+          <a:bodyPr wrap="square" rtlCol="0">
+            <a:spAutoFit/>
+          </a:bodyPr>
+          <a:lstStyle/>
+          <a:p>
+            <a:pPr algn="ctr"/>
+            <a:r>
+              <a:rPr lang="pt-PT" dirty="0" smtClean="0">
+                <a:solidFill>
+                  <a:srgbClr val="FF0000"/>
+                </a:solidFill>
+              </a:rPr>
+              <a:t>To do</a:t>
+            </a:r>
+            <a:endParaRPr lang="en-GB" dirty="0">
+              <a:solidFill>
+                <a:srgbClr val="FF0000"/>
+              </a:solidFill>
+            </a:endParaRPr>
+          </a:p>
+        </p:txBody>
+      </p:sp>
+    </p:spTree>
+    <p:extLst>
+      <p:ext uri="{BB962C8B-B14F-4D97-AF65-F5344CB8AC3E}">
+        <p14:creationId xmlns:p14="http://schemas.microsoft.com/office/powerpoint/2010/main" val="1675468560"/>
+      </p:ext>
+    </p:extLst>
+  </p:cSld>
+  <p:clrMapOvr>
+    <a:masterClrMapping/>
+  </p:clrMapOvr>
+  <p:timing>
+    <p:tnLst>
+      <p:par>
+        <p:cTn id="1" dur="indefinite" restart="never" nodeType="tmRoot"/>
+      </p:par>
+    </p:tnLst>
+  </p:timing>
 </p:sld>
 </file>
 
@@ -3082,6 +3260,13 @@
   <p:clrMapOvr>
     <a:masterClrMapping/>
   </p:clrMapOvr>
+  <p:timing>
+    <p:tnLst>
+      <p:par>
+        <p:cTn id="1" dur="indefinite" restart="never" nodeType="tmRoot"/>
+      </p:par>
+    </p:tnLst>
+  </p:timing>
 </p:sld>
 </file>
 
@@ -3155,6 +3340,13 @@
   <p:clrMapOvr>
     <a:masterClrMapping/>
   </p:clrMapOvr>
+  <p:timing>
+    <p:tnLst>
+      <p:par>
+        <p:cTn id="1" dur="indefinite" restart="never" nodeType="tmRoot"/>
+      </p:par>
+    </p:tnLst>
+  </p:timing>
 </p:sld>
 </file>
 
@@ -3224,6 +3416,13 @@
   <p:clrMapOvr>
     <a:masterClrMapping/>
   </p:clrMapOvr>
+  <p:timing>
+    <p:tnLst>
+      <p:par>
+        <p:cTn id="1" dur="indefinite" restart="never" nodeType="tmRoot"/>
+      </p:par>
+    </p:tnLst>
+  </p:timing>
 </p:sld>
 </file>
 
@@ -3284,6 +3483,598 @@
   <p:clrMapOvr>
     <a:masterClrMapping/>
   </p:clrMapOvr>
+  <p:timing>
+    <p:tnLst>
+      <p:par>
+        <p:cTn id="1" dur="indefinite" restart="never" nodeType="tmRoot"/>
+      </p:par>
+    </p:tnLst>
+  </p:timing>
+</p:sld>
+</file>
+
+<file path=ppt/slides/slide6.xml><?xml version="1.0" encoding="utf-8"?>
+<p:sld xmlns:a="http://schemas.openxmlformats.org/drawingml/2006/main" xmlns:r="http://schemas.openxmlformats.org/officeDocument/2006/relationships" xmlns:p="http://schemas.openxmlformats.org/presentationml/2006/main">
+  <p:cSld>
+    <p:spTree>
+      <p:nvGrpSpPr>
+        <p:cNvPr id="1" name=""/>
+        <p:cNvGrpSpPr/>
+        <p:nvPr/>
+      </p:nvGrpSpPr>
+      <p:grpSpPr>
+        <a:xfrm>
+          <a:off x="0" y="0"/>
+          <a:ext cx="0" cy="0"/>
+          <a:chOff x="0" y="0"/>
+          <a:chExt cx="0" cy="0"/>
+        </a:xfrm>
+      </p:grpSpPr>
+      <p:pic>
+        <p:nvPicPr>
+          <p:cNvPr id="3" name="Picture 2"/>
+          <p:cNvPicPr>
+            <a:picLocks noChangeAspect="1"/>
+          </p:cNvPicPr>
+          <p:nvPr/>
+        </p:nvPicPr>
+        <p:blipFill>
+          <a:blip r:embed="rId2">
+            <a:extLst>
+              <a:ext uri="{28A0092B-C50C-407E-A947-70E740481C1C}">
+                <a14:useLocalDpi xmlns:a14="http://schemas.microsoft.com/office/drawing/2010/main" val="0"/>
+              </a:ext>
+            </a:extLst>
+          </a:blip>
+          <a:stretch>
+            <a:fillRect/>
+          </a:stretch>
+        </p:blipFill>
+        <p:spPr>
+          <a:xfrm>
+            <a:off x="2477712" y="-238383"/>
+            <a:ext cx="7236576" cy="3658214"/>
+          </a:xfrm>
+          <a:prstGeom prst="rect">
+            <a:avLst/>
+          </a:prstGeom>
+        </p:spPr>
+      </p:pic>
+      <p:sp>
+        <p:nvSpPr>
+          <p:cNvPr id="2" name="TextBox 1"/>
+          <p:cNvSpPr txBox="1"/>
+          <p:nvPr/>
+        </p:nvSpPr>
+        <p:spPr>
+          <a:xfrm>
+            <a:off x="2829698" y="2705725"/>
+            <a:ext cx="6532605" cy="1446550"/>
+          </a:xfrm>
+          <a:prstGeom prst="rect">
+            <a:avLst/>
+          </a:prstGeom>
+          <a:noFill/>
+        </p:spPr>
+        <p:txBody>
+          <a:bodyPr wrap="square" rtlCol="0">
+            <a:spAutoFit/>
+          </a:bodyPr>
+          <a:lstStyle/>
+          <a:p>
+            <a:pPr algn="ctr"/>
+            <a:r>
+              <a:rPr lang="pt-PT" sz="8800" dirty="0" smtClean="0">
+                <a:solidFill>
+                  <a:schemeClr val="bg1"/>
+                </a:solidFill>
+                <a:latin typeface="+mj-lt"/>
+                <a:ea typeface="Roboto Lt" pitchFamily="2" charset="0"/>
+              </a:rPr>
+              <a:t>API</a:t>
+            </a:r>
+            <a:endParaRPr lang="en-GB" sz="8800" dirty="0">
+              <a:solidFill>
+                <a:schemeClr val="bg1"/>
+              </a:solidFill>
+              <a:latin typeface="+mj-lt"/>
+              <a:ea typeface="Roboto Lt" pitchFamily="2" charset="0"/>
+            </a:endParaRPr>
+          </a:p>
+        </p:txBody>
+      </p:sp>
+      <p:sp>
+        <p:nvSpPr>
+          <p:cNvPr id="4" name="TextBox 3"/>
+          <p:cNvSpPr txBox="1"/>
+          <p:nvPr/>
+        </p:nvSpPr>
+        <p:spPr>
+          <a:xfrm>
+            <a:off x="2829697" y="4538643"/>
+            <a:ext cx="6532605" cy="1446550"/>
+          </a:xfrm>
+          <a:prstGeom prst="rect">
+            <a:avLst/>
+          </a:prstGeom>
+          <a:noFill/>
+        </p:spPr>
+        <p:txBody>
+          <a:bodyPr wrap="square" rtlCol="0">
+            <a:spAutoFit/>
+          </a:bodyPr>
+          <a:lstStyle/>
+          <a:p>
+            <a:pPr algn="ctr"/>
+            <a:r>
+              <a:rPr lang="pt-PT" sz="8800" dirty="0" smtClean="0">
+                <a:solidFill>
+                  <a:schemeClr val="bg1"/>
+                </a:solidFill>
+                <a:latin typeface="+mj-lt"/>
+                <a:ea typeface="Roboto Lt" pitchFamily="2" charset="0"/>
+              </a:rPr>
+              <a:t>aplicação</a:t>
+            </a:r>
+            <a:endParaRPr lang="en-GB" sz="8800" dirty="0">
+              <a:solidFill>
+                <a:schemeClr val="bg1"/>
+              </a:solidFill>
+              <a:latin typeface="+mj-lt"/>
+              <a:ea typeface="Roboto Lt" pitchFamily="2" charset="0"/>
+            </a:endParaRPr>
+          </a:p>
+        </p:txBody>
+      </p:sp>
+      <p:sp>
+        <p:nvSpPr>
+          <p:cNvPr id="5" name="TextBox 4"/>
+          <p:cNvSpPr txBox="1"/>
+          <p:nvPr/>
+        </p:nvSpPr>
+        <p:spPr>
+          <a:xfrm rot="5400000">
+            <a:off x="5589374" y="1789267"/>
+            <a:ext cx="1013253" cy="1446550"/>
+          </a:xfrm>
+          <a:prstGeom prst="rect">
+            <a:avLst/>
+          </a:prstGeom>
+          <a:noFill/>
+        </p:spPr>
+        <p:txBody>
+          <a:bodyPr wrap="square" rtlCol="0">
+            <a:spAutoFit/>
+          </a:bodyPr>
+          <a:lstStyle/>
+          <a:p>
+            <a:pPr algn="ctr"/>
+            <a:r>
+              <a:rPr lang="pt-PT" sz="8800" dirty="0" smtClean="0">
+                <a:solidFill>
+                  <a:srgbClr val="FA1D28"/>
+                </a:solidFill>
+                <a:latin typeface="+mj-lt"/>
+                <a:ea typeface="Roboto Lt" pitchFamily="2" charset="0"/>
+              </a:rPr>
+              <a:t>&gt;</a:t>
+            </a:r>
+            <a:endParaRPr lang="en-GB" sz="8800" dirty="0">
+              <a:solidFill>
+                <a:srgbClr val="FA1D28"/>
+              </a:solidFill>
+              <a:latin typeface="+mj-lt"/>
+              <a:ea typeface="Roboto Lt" pitchFamily="2" charset="0"/>
+            </a:endParaRPr>
+          </a:p>
+        </p:txBody>
+      </p:sp>
+      <p:sp>
+        <p:nvSpPr>
+          <p:cNvPr id="7" name="TextBox 6"/>
+          <p:cNvSpPr txBox="1"/>
+          <p:nvPr/>
+        </p:nvSpPr>
+        <p:spPr>
+          <a:xfrm rot="5400000">
+            <a:off x="5589374" y="3721041"/>
+            <a:ext cx="1013253" cy="1446550"/>
+          </a:xfrm>
+          <a:prstGeom prst="rect">
+            <a:avLst/>
+          </a:prstGeom>
+          <a:noFill/>
+        </p:spPr>
+        <p:txBody>
+          <a:bodyPr wrap="square" rtlCol="0">
+            <a:spAutoFit/>
+          </a:bodyPr>
+          <a:lstStyle/>
+          <a:p>
+            <a:pPr algn="ctr"/>
+            <a:r>
+              <a:rPr lang="pt-PT" sz="8800" dirty="0" smtClean="0">
+                <a:solidFill>
+                  <a:srgbClr val="FA1D28"/>
+                </a:solidFill>
+                <a:latin typeface="+mj-lt"/>
+                <a:ea typeface="Roboto Lt" pitchFamily="2" charset="0"/>
+              </a:rPr>
+              <a:t>&gt;</a:t>
+            </a:r>
+            <a:endParaRPr lang="en-GB" sz="8800" dirty="0">
+              <a:solidFill>
+                <a:srgbClr val="FA1D28"/>
+              </a:solidFill>
+              <a:latin typeface="+mj-lt"/>
+              <a:ea typeface="Roboto Lt" pitchFamily="2" charset="0"/>
+            </a:endParaRPr>
+          </a:p>
+        </p:txBody>
+      </p:sp>
+    </p:spTree>
+    <p:extLst>
+      <p:ext uri="{BB962C8B-B14F-4D97-AF65-F5344CB8AC3E}">
+        <p14:creationId xmlns:p14="http://schemas.microsoft.com/office/powerpoint/2010/main" val="174576648"/>
+      </p:ext>
+    </p:extLst>
+  </p:cSld>
+  <p:clrMapOvr>
+    <a:masterClrMapping/>
+  </p:clrMapOvr>
+</p:sld>
+</file>
+
+<file path=ppt/slides/slide7.xml><?xml version="1.0" encoding="utf-8"?>
+<p:sld xmlns:a="http://schemas.openxmlformats.org/drawingml/2006/main" xmlns:r="http://schemas.openxmlformats.org/officeDocument/2006/relationships" xmlns:p="http://schemas.openxmlformats.org/presentationml/2006/main">
+  <p:cSld>
+    <p:spTree>
+      <p:nvGrpSpPr>
+        <p:cNvPr id="1" name=""/>
+        <p:cNvGrpSpPr/>
+        <p:nvPr/>
+      </p:nvGrpSpPr>
+      <p:grpSpPr>
+        <a:xfrm>
+          <a:off x="0" y="0"/>
+          <a:ext cx="0" cy="0"/>
+          <a:chOff x="0" y="0"/>
+          <a:chExt cx="0" cy="0"/>
+        </a:xfrm>
+      </p:grpSpPr>
+      <p:pic>
+        <p:nvPicPr>
+          <p:cNvPr id="8" name="Picture 7"/>
+          <p:cNvPicPr>
+            <a:picLocks noChangeAspect="1"/>
+          </p:cNvPicPr>
+          <p:nvPr/>
+        </p:nvPicPr>
+        <p:blipFill>
+          <a:blip r:embed="rId2">
+            <a:extLst>
+              <a:ext uri="{28A0092B-C50C-407E-A947-70E740481C1C}">
+                <a14:useLocalDpi xmlns:a14="http://schemas.microsoft.com/office/drawing/2010/main" val="0"/>
+              </a:ext>
+            </a:extLst>
+          </a:blip>
+          <a:stretch>
+            <a:fillRect/>
+          </a:stretch>
+        </p:blipFill>
+        <p:spPr>
+          <a:xfrm>
+            <a:off x="2278317" y="3599938"/>
+            <a:ext cx="7635367" cy="3859810"/>
+          </a:xfrm>
+          <a:prstGeom prst="rect">
+            <a:avLst/>
+          </a:prstGeom>
+        </p:spPr>
+      </p:pic>
+      <p:pic>
+        <p:nvPicPr>
+          <p:cNvPr id="3" name="Picture 2"/>
+          <p:cNvPicPr>
+            <a:picLocks noChangeAspect="1"/>
+          </p:cNvPicPr>
+          <p:nvPr/>
+        </p:nvPicPr>
+        <p:blipFill>
+          <a:blip r:embed="rId3">
+            <a:extLst>
+              <a:ext uri="{28A0092B-C50C-407E-A947-70E740481C1C}">
+                <a14:useLocalDpi xmlns:a14="http://schemas.microsoft.com/office/drawing/2010/main" val="0"/>
+              </a:ext>
+            </a:extLst>
+          </a:blip>
+          <a:stretch>
+            <a:fillRect/>
+          </a:stretch>
+        </p:blipFill>
+        <p:spPr>
+          <a:xfrm>
+            <a:off x="2477712" y="-238383"/>
+            <a:ext cx="7236576" cy="3658214"/>
+          </a:xfrm>
+          <a:prstGeom prst="rect">
+            <a:avLst/>
+          </a:prstGeom>
+        </p:spPr>
+      </p:pic>
+      <p:sp>
+        <p:nvSpPr>
+          <p:cNvPr id="2" name="TextBox 1"/>
+          <p:cNvSpPr txBox="1"/>
+          <p:nvPr/>
+        </p:nvSpPr>
+        <p:spPr>
+          <a:xfrm>
+            <a:off x="2829698" y="2705725"/>
+            <a:ext cx="6532605" cy="1446550"/>
+          </a:xfrm>
+          <a:prstGeom prst="rect">
+            <a:avLst/>
+          </a:prstGeom>
+          <a:noFill/>
+        </p:spPr>
+        <p:txBody>
+          <a:bodyPr wrap="square" rtlCol="0">
+            <a:spAutoFit/>
+          </a:bodyPr>
+          <a:lstStyle/>
+          <a:p>
+            <a:pPr algn="ctr"/>
+            <a:r>
+              <a:rPr lang="pt-PT" sz="8800" dirty="0" smtClean="0">
+                <a:solidFill>
+                  <a:schemeClr val="bg1"/>
+                </a:solidFill>
+                <a:latin typeface="+mj-lt"/>
+                <a:ea typeface="Roboto Lt" pitchFamily="2" charset="0"/>
+              </a:rPr>
+              <a:t>API</a:t>
+            </a:r>
+            <a:endParaRPr lang="en-GB" sz="8800" dirty="0">
+              <a:solidFill>
+                <a:schemeClr val="bg1"/>
+              </a:solidFill>
+              <a:latin typeface="+mj-lt"/>
+              <a:ea typeface="Roboto Lt" pitchFamily="2" charset="0"/>
+            </a:endParaRPr>
+          </a:p>
+        </p:txBody>
+      </p:sp>
+      <p:sp>
+        <p:nvSpPr>
+          <p:cNvPr id="5" name="TextBox 4"/>
+          <p:cNvSpPr txBox="1"/>
+          <p:nvPr/>
+        </p:nvSpPr>
+        <p:spPr>
+          <a:xfrm rot="5400000">
+            <a:off x="5589374" y="1789267"/>
+            <a:ext cx="1013253" cy="1446550"/>
+          </a:xfrm>
+          <a:prstGeom prst="rect">
+            <a:avLst/>
+          </a:prstGeom>
+          <a:noFill/>
+        </p:spPr>
+        <p:txBody>
+          <a:bodyPr wrap="square" rtlCol="0">
+            <a:spAutoFit/>
+          </a:bodyPr>
+          <a:lstStyle/>
+          <a:p>
+            <a:pPr algn="ctr"/>
+            <a:r>
+              <a:rPr lang="pt-PT" sz="8800" dirty="0" smtClean="0">
+                <a:solidFill>
+                  <a:srgbClr val="FA1D28"/>
+                </a:solidFill>
+                <a:latin typeface="+mj-lt"/>
+                <a:ea typeface="Roboto Lt" pitchFamily="2" charset="0"/>
+              </a:rPr>
+              <a:t>&gt;</a:t>
+            </a:r>
+            <a:endParaRPr lang="en-GB" sz="8800" dirty="0">
+              <a:solidFill>
+                <a:srgbClr val="FA1D28"/>
+              </a:solidFill>
+              <a:latin typeface="+mj-lt"/>
+              <a:ea typeface="Roboto Lt" pitchFamily="2" charset="0"/>
+            </a:endParaRPr>
+          </a:p>
+        </p:txBody>
+      </p:sp>
+      <p:sp>
+        <p:nvSpPr>
+          <p:cNvPr id="7" name="TextBox 6"/>
+          <p:cNvSpPr txBox="1"/>
+          <p:nvPr/>
+        </p:nvSpPr>
+        <p:spPr>
+          <a:xfrm rot="5400000">
+            <a:off x="5589374" y="3721041"/>
+            <a:ext cx="1013253" cy="1446550"/>
+          </a:xfrm>
+          <a:prstGeom prst="rect">
+            <a:avLst/>
+          </a:prstGeom>
+          <a:noFill/>
+        </p:spPr>
+        <p:txBody>
+          <a:bodyPr wrap="square" rtlCol="0">
+            <a:spAutoFit/>
+          </a:bodyPr>
+          <a:lstStyle/>
+          <a:p>
+            <a:pPr algn="ctr"/>
+            <a:r>
+              <a:rPr lang="pt-PT" sz="8800" dirty="0" smtClean="0">
+                <a:solidFill>
+                  <a:srgbClr val="FA1D28"/>
+                </a:solidFill>
+                <a:latin typeface="+mj-lt"/>
+                <a:ea typeface="Roboto Lt" pitchFamily="2" charset="0"/>
+              </a:rPr>
+              <a:t>&gt;</a:t>
+            </a:r>
+            <a:endParaRPr lang="en-GB" sz="8800" dirty="0">
+              <a:solidFill>
+                <a:srgbClr val="FA1D28"/>
+              </a:solidFill>
+              <a:latin typeface="+mj-lt"/>
+              <a:ea typeface="Roboto Lt" pitchFamily="2" charset="0"/>
+            </a:endParaRPr>
+          </a:p>
+        </p:txBody>
+      </p:sp>
+    </p:spTree>
+    <p:extLst>
+      <p:ext uri="{BB962C8B-B14F-4D97-AF65-F5344CB8AC3E}">
+        <p14:creationId xmlns:p14="http://schemas.microsoft.com/office/powerpoint/2010/main" val="1325954516"/>
+      </p:ext>
+    </p:extLst>
+  </p:cSld>
+  <p:clrMapOvr>
+    <a:masterClrMapping/>
+  </p:clrMapOvr>
+</p:sld>
+</file>
+
+<file path=ppt/slides/slide8.xml><?xml version="1.0" encoding="utf-8"?>
+<p:sld xmlns:a="http://schemas.openxmlformats.org/drawingml/2006/main" xmlns:r="http://schemas.openxmlformats.org/officeDocument/2006/relationships" xmlns:p="http://schemas.openxmlformats.org/presentationml/2006/main">
+  <p:cSld>
+    <p:spTree>
+      <p:nvGrpSpPr>
+        <p:cNvPr id="1" name=""/>
+        <p:cNvGrpSpPr/>
+        <p:nvPr/>
+      </p:nvGrpSpPr>
+      <p:grpSpPr>
+        <a:xfrm>
+          <a:off x="0" y="0"/>
+          <a:ext cx="0" cy="0"/>
+          <a:chOff x="0" y="0"/>
+          <a:chExt cx="0" cy="0"/>
+        </a:xfrm>
+      </p:grpSpPr>
+      <p:pic>
+        <p:nvPicPr>
+          <p:cNvPr id="2" name="Picture 1"/>
+          <p:cNvPicPr>
+            <a:picLocks noChangeAspect="1"/>
+          </p:cNvPicPr>
+          <p:nvPr/>
+        </p:nvPicPr>
+        <p:blipFill>
+          <a:blip r:embed="rId2">
+            <a:extLst>
+              <a:ext uri="{28A0092B-C50C-407E-A947-70E740481C1C}">
+                <a14:useLocalDpi xmlns:a14="http://schemas.microsoft.com/office/drawing/2010/main" val="0"/>
+              </a:ext>
+            </a:extLst>
+          </a:blip>
+          <a:stretch>
+            <a:fillRect/>
+          </a:stretch>
+        </p:blipFill>
+        <p:spPr>
+          <a:xfrm>
+            <a:off x="1676765" y="1195001"/>
+            <a:ext cx="8838469" cy="4467998"/>
+          </a:xfrm>
+          <a:prstGeom prst="rect">
+            <a:avLst/>
+          </a:prstGeom>
+        </p:spPr>
+      </p:pic>
+    </p:spTree>
+    <p:extLst>
+      <p:ext uri="{BB962C8B-B14F-4D97-AF65-F5344CB8AC3E}">
+        <p14:creationId xmlns:p14="http://schemas.microsoft.com/office/powerpoint/2010/main" val="3184951898"/>
+      </p:ext>
+    </p:extLst>
+  </p:cSld>
+  <p:clrMapOvr>
+    <a:masterClrMapping/>
+  </p:clrMapOvr>
+  <p:timing>
+    <p:tnLst>
+      <p:par>
+        <p:cTn id="1" dur="indefinite" restart="never" nodeType="tmRoot"/>
+      </p:par>
+    </p:tnLst>
+  </p:timing>
+</p:sld>
+</file>
+
+<file path=ppt/slides/slide9.xml><?xml version="1.0" encoding="utf-8"?>
+<p:sld xmlns:a="http://schemas.openxmlformats.org/drawingml/2006/main" xmlns:r="http://schemas.openxmlformats.org/officeDocument/2006/relationships" xmlns:p="http://schemas.openxmlformats.org/presentationml/2006/main">
+  <p:cSld>
+    <p:spTree>
+      <p:nvGrpSpPr>
+        <p:cNvPr id="1" name=""/>
+        <p:cNvGrpSpPr/>
+        <p:nvPr/>
+      </p:nvGrpSpPr>
+      <p:grpSpPr>
+        <a:xfrm>
+          <a:off x="0" y="0"/>
+          <a:ext cx="0" cy="0"/>
+          <a:chOff x="0" y="0"/>
+          <a:chExt cx="0" cy="0"/>
+        </a:xfrm>
+      </p:grpSpPr>
+      <p:pic>
+        <p:nvPicPr>
+          <p:cNvPr id="3" name="Picture 2"/>
+          <p:cNvPicPr>
+            <a:picLocks noChangeAspect="1"/>
+          </p:cNvPicPr>
+          <p:nvPr/>
+        </p:nvPicPr>
+        <p:blipFill>
+          <a:blip r:embed="rId2" cstate="print">
+            <a:extLst>
+              <a:ext uri="{28A0092B-C50C-407E-A947-70E740481C1C}">
+                <a14:useLocalDpi xmlns:a14="http://schemas.microsoft.com/office/drawing/2010/main" val="0"/>
+              </a:ext>
+            </a:extLst>
+          </a:blip>
+          <a:stretch>
+            <a:fillRect/>
+          </a:stretch>
+        </p:blipFill>
+        <p:spPr>
+          <a:xfrm>
+            <a:off x="1285468" y="0"/>
+            <a:ext cx="9621063" cy="6858000"/>
+          </a:xfrm>
+          <a:prstGeom prst="rect">
+            <a:avLst/>
+          </a:prstGeom>
+        </p:spPr>
+      </p:pic>
+    </p:spTree>
+    <p:extLst>
+      <p:ext uri="{BB962C8B-B14F-4D97-AF65-F5344CB8AC3E}">
+        <p14:creationId xmlns:p14="http://schemas.microsoft.com/office/powerpoint/2010/main" val="2823353361"/>
+      </p:ext>
+    </p:extLst>
+  </p:cSld>
+  <p:clrMapOvr>
+    <a:masterClrMapping/>
+  </p:clrMapOvr>
+  <p:timing>
+    <p:tnLst>
+      <p:par>
+        <p:cTn id="1" dur="indefinite" restart="never" nodeType="tmRoot"/>
+      </p:par>
+    </p:tnLst>
+  </p:timing>
 </p:sld>
 </file>
 

</xml_diff>